<commit_message>
added VT DOH data
</commit_message>
<xml_diff>
--- a/assignments/assignment 4/VT_DOH_slides.pptx
+++ b/assignments/assignment 4/VT_DOH_slides.pptx
@@ -223,7 +223,7 @@
           <a:p>
             <a:fld id="{E39B216C-26CB-4A32-9977-82CC976A064C}" type="datetimeFigureOut">
               <a:rPr lang="en-US" smtClean="0"/>
-              <a:t>2/10/2022</a:t>
+              <a:t>2/11/22</a:t>
             </a:fld>
             <a:endParaRPr lang="en-US"/>
           </a:p>
@@ -400,7 +400,7 @@
           <a:p>
             <a:fld id="{7E249CFA-ED21-4D73-9AE8-2B99149E4F98}" type="datetimeFigureOut">
               <a:rPr lang="en-US" smtClean="0"/>
-              <a:t>2/10/2022</a:t>
+              <a:t>2/11/22</a:t>
             </a:fld>
             <a:endParaRPr lang="en-US"/>
           </a:p>
@@ -1812,7 +1812,7 @@
           <a:p>
             <a:fld id="{C783D92E-BEC9-4C0E-AA70-08E16DD9B6A8}" type="datetimeFigureOut">
               <a:rPr lang="en-US" smtClean="0"/>
-              <a:t>2/10/2022</a:t>
+              <a:t>2/11/22</a:t>
             </a:fld>
             <a:endParaRPr lang="en-US"/>
           </a:p>
@@ -1982,7 +1982,7 @@
           <a:p>
             <a:fld id="{C783D92E-BEC9-4C0E-AA70-08E16DD9B6A8}" type="datetimeFigureOut">
               <a:rPr lang="en-US" smtClean="0"/>
-              <a:t>2/10/2022</a:t>
+              <a:t>2/11/22</a:t>
             </a:fld>
             <a:endParaRPr lang="en-US"/>
           </a:p>
@@ -2226,7 +2226,7 @@
           <a:p>
             <a:fld id="{C783D92E-BEC9-4C0E-AA70-08E16DD9B6A8}" type="datetimeFigureOut">
               <a:rPr lang="en-US" smtClean="0"/>
-              <a:t>2/10/2022</a:t>
+              <a:t>2/11/22</a:t>
             </a:fld>
             <a:endParaRPr lang="en-US"/>
           </a:p>
@@ -2458,7 +2458,7 @@
           <a:p>
             <a:fld id="{C783D92E-BEC9-4C0E-AA70-08E16DD9B6A8}" type="datetimeFigureOut">
               <a:rPr lang="en-US" smtClean="0"/>
-              <a:t>2/10/2022</a:t>
+              <a:t>2/11/22</a:t>
             </a:fld>
             <a:endParaRPr lang="en-US"/>
           </a:p>
@@ -2825,7 +2825,7 @@
           <a:p>
             <a:fld id="{C783D92E-BEC9-4C0E-AA70-08E16DD9B6A8}" type="datetimeFigureOut">
               <a:rPr lang="en-US" smtClean="0"/>
-              <a:t>2/10/2022</a:t>
+              <a:t>2/11/22</a:t>
             </a:fld>
             <a:endParaRPr lang="en-US"/>
           </a:p>
@@ -2943,7 +2943,7 @@
           <a:p>
             <a:fld id="{C783D92E-BEC9-4C0E-AA70-08E16DD9B6A8}" type="datetimeFigureOut">
               <a:rPr lang="en-US" smtClean="0"/>
-              <a:t>2/10/2022</a:t>
+              <a:t>2/11/22</a:t>
             </a:fld>
             <a:endParaRPr lang="en-US"/>
           </a:p>
@@ -3038,7 +3038,7 @@
           <a:p>
             <a:fld id="{C783D92E-BEC9-4C0E-AA70-08E16DD9B6A8}" type="datetimeFigureOut">
               <a:rPr lang="en-US" smtClean="0"/>
-              <a:t>2/10/2022</a:t>
+              <a:t>2/11/22</a:t>
             </a:fld>
             <a:endParaRPr lang="en-US"/>
           </a:p>
@@ -3315,7 +3315,7 @@
           <a:p>
             <a:fld id="{C783D92E-BEC9-4C0E-AA70-08E16DD9B6A8}" type="datetimeFigureOut">
               <a:rPr lang="en-US" smtClean="0"/>
-              <a:t>2/10/2022</a:t>
+              <a:t>2/11/22</a:t>
             </a:fld>
             <a:endParaRPr lang="en-US"/>
           </a:p>
@@ -3572,7 +3572,7 @@
           <a:p>
             <a:fld id="{C783D92E-BEC9-4C0E-AA70-08E16DD9B6A8}" type="datetimeFigureOut">
               <a:rPr lang="en-US" smtClean="0"/>
-              <a:t>2/10/2022</a:t>
+              <a:t>2/11/22</a:t>
             </a:fld>
             <a:endParaRPr lang="en-US"/>
           </a:p>
@@ -4001,7 +4001,7 @@
           <a:p>
             <a:fld id="{C783D92E-BEC9-4C0E-AA70-08E16DD9B6A8}" type="datetimeFigureOut">
               <a:rPr lang="en-US" smtClean="0"/>
-              <a:t>2/10/2022</a:t>
+              <a:t>2/11/22</a:t>
             </a:fld>
             <a:endParaRPr lang="en-US"/>
           </a:p>
@@ -4181,7 +4181,7 @@
           <a:p>
             <a:fld id="{C783D92E-BEC9-4C0E-AA70-08E16DD9B6A8}" type="datetimeFigureOut">
               <a:rPr lang="en-US" smtClean="0"/>
-              <a:t>2/10/2022</a:t>
+              <a:t>2/11/22</a:t>
             </a:fld>
             <a:endParaRPr lang="en-US"/>
           </a:p>
@@ -6600,7 +6600,7 @@
           <a:p>
             <a:fld id="{C783D92E-BEC9-4C0E-AA70-08E16DD9B6A8}" type="datetimeFigureOut">
               <a:rPr lang="en-US" smtClean="0"/>
-              <a:t>2/10/2022</a:t>
+              <a:t>2/11/22</a:t>
             </a:fld>
             <a:endParaRPr lang="en-US"/>
           </a:p>
@@ -12320,100 +12320,15 @@
 </file>
 
 <file path=customXml/item1.xml><?xml version="1.0" encoding="utf-8"?>
-<p:properties xmlns:p="http://schemas.microsoft.com/office/2006/metadata/properties" xmlns:xsi="http://www.w3.org/2001/XMLSchema-instance" xmlns:pc="http://schemas.microsoft.com/office/infopath/2007/PartnerControls">
-  <documentManagement>
-    <TagTopic xmlns="bfc7ab43-a351-4688-aca3-bf166918b94c">
-      <Value>Marketing</Value>
-      <Value>Resources</Value>
-      <Value>Tools &amp; Resources</Value>
-    </TagTopic>
-    <VDHUnit2 xmlns="046f9449-3d25-46ac-9a39-b41fdb973d2f">3</VDHUnit2>
-    <VDHDocumentType xmlns="046f9449-3d25-46ac-9a39-b41fdb973d2f">6</VDHDocumentType>
-    <ItemOwner xmlns="046f9449-3d25-46ac-9a39-b41fdb973d2f">
-      <UserInfo>
-        <DisplayName>i:0#.f|membership|kathleen.horton@vermont.gov,#i:0#.f|membership|kathleen.horton@vermont.gov,#Kathleen.Horton@vermont.gov,#,#Horton, Kathleen,#,#AHS,#Communications &amp; Outreach Coordinator</DisplayName>
-        <AccountId>4282</AccountId>
-        <AccountType/>
-      </UserInfo>
-    </ItemOwner>
-    <Content_x0020_Lead xmlns="046f9449-3d25-46ac-9a39-b41fdb973d2f">
-      <UserInfo>
-        <DisplayName>i:0#.f|membership|sharon.muellers@vermont.gov,#i:0#.f|membership|sharon.muellers@vermont.gov,#Sharon.Muellers@vermont.gov,#,#Muellers, Sharon,#,#AHS,#Communication Officer</DisplayName>
-        <AccountId>3837</AccountId>
-        <AccountType/>
-      </UserInfo>
-    </Content_x0020_Lead>
-    <Reviewed xmlns="046f9449-3d25-46ac-9a39-b41fdb973d2f">true</Reviewed>
-    <Resource_x0020_Description xmlns="bfc7ab43-a351-4688-aca3-bf166918b94c" xsi:nil="true"/>
-    <LastReviewed xmlns="046f9449-3d25-46ac-9a39-b41fdb973d2f">2019-06-27T12:04:05+00:00</LastReviewed>
-    <bucketTopic xmlns="bfc7ab43-a351-4688-aca3-bf166918b94c">Resources</bucketTopic>
-    <NextReviewDate xmlns="046f9449-3d25-46ac-9a39-b41fdb973d2f" xsi:nil="true"/>
-  </documentManagement>
-</p:properties>
+<?mso-contentType ?>
+<FormTemplates xmlns="http://schemas.microsoft.com/sharepoint/v3/contenttype/forms">
+  <Display>DocumentLibraryForm</Display>
+  <Edit>DocumentLibraryForm</Edit>
+  <New>DocumentLibraryForm</New>
+</FormTemplates>
 </file>
 
 <file path=customXml/item2.xml><?xml version="1.0" encoding="utf-8"?>
-<?mso-contentType ?>
-<spe:Receivers xmlns:spe="http://schemas.microsoft.com/sharepoint/events">
-  <Receiver>
-    <Name>Microsoft.Office.RecordsManagement.PolicyFeatures.ExpirationEventReceiver</Name>
-    <Synchronization>Synchronous</Synchronization>
-    <Type>10001</Type>
-    <SequenceNumber>101</SequenceNumber>
-    <Url/>
-    <Assembly>Microsoft.Office.Policy, Version=16.0.0.0, Culture=neutral, PublicKeyToken=71e9bce111e9429c</Assembly>
-    <Class>Microsoft.Office.RecordsManagement.Internal.UpdateExpireDate</Class>
-    <Data/>
-    <Filter/>
-  </Receiver>
-  <Receiver>
-    <Name>Microsoft.Office.RecordsManagement.PolicyFeatures.ExpirationEventReceiver</Name>
-    <Synchronization>Synchronous</Synchronization>
-    <Type>10002</Type>
-    <SequenceNumber>102</SequenceNumber>
-    <Url/>
-    <Assembly>Microsoft.Office.Policy, Version=16.0.0.0, Culture=neutral, PublicKeyToken=71e9bce111e9429c</Assembly>
-    <Class>Microsoft.Office.RecordsManagement.Internal.UpdateExpireDate</Class>
-    <Data/>
-    <Filter/>
-  </Receiver>
-  <Receiver>
-    <Name>Microsoft.Office.RecordsManagement.PolicyFeatures.ExpirationEventReceiver</Name>
-    <Synchronization>Synchronous</Synchronization>
-    <Type>10004</Type>
-    <SequenceNumber>103</SequenceNumber>
-    <Url/>
-    <Assembly>Microsoft.Office.Policy, Version=16.0.0.0, Culture=neutral, PublicKeyToken=71e9bce111e9429c</Assembly>
-    <Class>Microsoft.Office.RecordsManagement.Internal.UpdateExpireDate</Class>
-    <Data/>
-    <Filter/>
-  </Receiver>
-  <Receiver>
-    <Name>Microsoft.Office.RecordsManagement.PolicyFeatures.ExpirationEventReceiver</Name>
-    <Synchronization>Synchronous</Synchronization>
-    <Type>10006</Type>
-    <SequenceNumber>104</SequenceNumber>
-    <Url/>
-    <Assembly>Microsoft.Office.Policy, Version=16.0.0.0, Culture=neutral, PublicKeyToken=71e9bce111e9429c</Assembly>
-    <Class>Microsoft.Office.RecordsManagement.Internal.UpdateExpireDate</Class>
-    <Data/>
-    <Filter/>
-  </Receiver>
-  <Receiver>
-    <Name>Microsoft.Office.RecordsManagement.PolicyFeatures.ExpirationEventReceiver</Name>
-    <Synchronization>Synchronous</Synchronization>
-    <Type>10009</Type>
-    <SequenceNumber>105</SequenceNumber>
-    <Url/>
-    <Assembly>Microsoft.Office.Policy, Version=16.0.0.0, Culture=neutral, PublicKeyToken=71e9bce111e9429c</Assembly>
-    <Class>Microsoft.Office.RecordsManagement.Internal.UpdateExpireDate</Class>
-    <Data/>
-    <Filter/>
-  </Receiver>
-</spe:Receivers>
-</file>
-
-<file path=customXml/item3.xml><?xml version="1.0" encoding="utf-8"?>
 <ct:contentTypeSchema xmlns:ct="http://schemas.microsoft.com/office/2006/metadata/contentType" xmlns:ma="http://schemas.microsoft.com/office/2006/metadata/properties/metaAttributes" ct:_="" ma:_="" ma:contentTypeName="VDH Managed Document" ma:contentTypeID="0x010100E33B793E1E7D4240861BC825712579F5020100565C5DFC0583BD42A423A1682711FA6D" ma:contentTypeVersion="48" ma:contentTypeDescription="" ma:contentTypeScope="" ma:versionID="d288c967c3227edf9448a73b63a3f98e">
   <xsd:schema xmlns:xsd="http://www.w3.org/2001/XMLSchema" xmlns:xs="http://www.w3.org/2001/XMLSchema" xmlns:p="http://schemas.microsoft.com/office/2006/metadata/properties" xmlns:ns1="http://schemas.microsoft.com/sharepoint/v3" xmlns:ns2="046f9449-3d25-46ac-9a39-b41fdb973d2f" xmlns:ns3="bfc7ab43-a351-4688-aca3-bf166918b94c" xmlns:ns4="a6fb58ca-3225-4afd-985f-6a849fc96194" targetNamespace="http://schemas.microsoft.com/office/2006/metadata/properties" ma:root="true" ma:fieldsID="8ad10dd5b9faeafd6eeef64276ab95a0" ns1:_="" ns2:_="" ns3:_="" ns4:_="">
     <xsd:import namespace="http://schemas.microsoft.com/sharepoint/v3"/>
@@ -12792,43 +12707,109 @@
 </ct:contentTypeSchema>
 </file>
 
+<file path=customXml/item3.xml><?xml version="1.0" encoding="utf-8"?>
+<?mso-contentType ?>
+<spe:Receivers xmlns:spe="http://schemas.microsoft.com/sharepoint/events">
+  <Receiver>
+    <Name>Microsoft.Office.RecordsManagement.PolicyFeatures.ExpirationEventReceiver</Name>
+    <Synchronization>Synchronous</Synchronization>
+    <Type>10001</Type>
+    <SequenceNumber>101</SequenceNumber>
+    <Url/>
+    <Assembly>Microsoft.Office.Policy, Version=16.0.0.0, Culture=neutral, PublicKeyToken=71e9bce111e9429c</Assembly>
+    <Class>Microsoft.Office.RecordsManagement.Internal.UpdateExpireDate</Class>
+    <Data/>
+    <Filter/>
+  </Receiver>
+  <Receiver>
+    <Name>Microsoft.Office.RecordsManagement.PolicyFeatures.ExpirationEventReceiver</Name>
+    <Synchronization>Synchronous</Synchronization>
+    <Type>10002</Type>
+    <SequenceNumber>102</SequenceNumber>
+    <Url/>
+    <Assembly>Microsoft.Office.Policy, Version=16.0.0.0, Culture=neutral, PublicKeyToken=71e9bce111e9429c</Assembly>
+    <Class>Microsoft.Office.RecordsManagement.Internal.UpdateExpireDate</Class>
+    <Data/>
+    <Filter/>
+  </Receiver>
+  <Receiver>
+    <Name>Microsoft.Office.RecordsManagement.PolicyFeatures.ExpirationEventReceiver</Name>
+    <Synchronization>Synchronous</Synchronization>
+    <Type>10004</Type>
+    <SequenceNumber>103</SequenceNumber>
+    <Url/>
+    <Assembly>Microsoft.Office.Policy, Version=16.0.0.0, Culture=neutral, PublicKeyToken=71e9bce111e9429c</Assembly>
+    <Class>Microsoft.Office.RecordsManagement.Internal.UpdateExpireDate</Class>
+    <Data/>
+    <Filter/>
+  </Receiver>
+  <Receiver>
+    <Name>Microsoft.Office.RecordsManagement.PolicyFeatures.ExpirationEventReceiver</Name>
+    <Synchronization>Synchronous</Synchronization>
+    <Type>10006</Type>
+    <SequenceNumber>104</SequenceNumber>
+    <Url/>
+    <Assembly>Microsoft.Office.Policy, Version=16.0.0.0, Culture=neutral, PublicKeyToken=71e9bce111e9429c</Assembly>
+    <Class>Microsoft.Office.RecordsManagement.Internal.UpdateExpireDate</Class>
+    <Data/>
+    <Filter/>
+  </Receiver>
+  <Receiver>
+    <Name>Microsoft.Office.RecordsManagement.PolicyFeatures.ExpirationEventReceiver</Name>
+    <Synchronization>Synchronous</Synchronization>
+    <Type>10009</Type>
+    <SequenceNumber>105</SequenceNumber>
+    <Url/>
+    <Assembly>Microsoft.Office.Policy, Version=16.0.0.0, Culture=neutral, PublicKeyToken=71e9bce111e9429c</Assembly>
+    <Class>Microsoft.Office.RecordsManagement.Internal.UpdateExpireDate</Class>
+    <Data/>
+    <Filter/>
+  </Receiver>
+</spe:Receivers>
+</file>
+
 <file path=customXml/item4.xml><?xml version="1.0" encoding="utf-8"?>
-<?mso-contentType ?>
-<FormTemplates xmlns="http://schemas.microsoft.com/sharepoint/v3/contenttype/forms">
-  <Display>DocumentLibraryForm</Display>
-  <Edit>DocumentLibraryForm</Edit>
-  <New>DocumentLibraryForm</New>
-</FormTemplates>
+<p:properties xmlns:p="http://schemas.microsoft.com/office/2006/metadata/properties" xmlns:xsi="http://www.w3.org/2001/XMLSchema-instance" xmlns:pc="http://schemas.microsoft.com/office/infopath/2007/PartnerControls">
+  <documentManagement>
+    <TagTopic xmlns="bfc7ab43-a351-4688-aca3-bf166918b94c">
+      <Value>Marketing</Value>
+      <Value>Resources</Value>
+      <Value>Tools &amp; Resources</Value>
+    </TagTopic>
+    <VDHUnit2 xmlns="046f9449-3d25-46ac-9a39-b41fdb973d2f">3</VDHUnit2>
+    <VDHDocumentType xmlns="046f9449-3d25-46ac-9a39-b41fdb973d2f">6</VDHDocumentType>
+    <ItemOwner xmlns="046f9449-3d25-46ac-9a39-b41fdb973d2f">
+      <UserInfo>
+        <DisplayName>i:0#.f|membership|kathleen.horton@vermont.gov,#i:0#.f|membership|kathleen.horton@vermont.gov,#Kathleen.Horton@vermont.gov,#,#Horton, Kathleen,#,#AHS,#Communications &amp; Outreach Coordinator</DisplayName>
+        <AccountId>4282</AccountId>
+        <AccountType/>
+      </UserInfo>
+    </ItemOwner>
+    <Content_x0020_Lead xmlns="046f9449-3d25-46ac-9a39-b41fdb973d2f">
+      <UserInfo>
+        <DisplayName>i:0#.f|membership|sharon.muellers@vermont.gov,#i:0#.f|membership|sharon.muellers@vermont.gov,#Sharon.Muellers@vermont.gov,#,#Muellers, Sharon,#,#AHS,#Communication Officer</DisplayName>
+        <AccountId>3837</AccountId>
+        <AccountType/>
+      </UserInfo>
+    </Content_x0020_Lead>
+    <Reviewed xmlns="046f9449-3d25-46ac-9a39-b41fdb973d2f">true</Reviewed>
+    <Resource_x0020_Description xmlns="bfc7ab43-a351-4688-aca3-bf166918b94c" xsi:nil="true"/>
+    <LastReviewed xmlns="046f9449-3d25-46ac-9a39-b41fdb973d2f">2019-06-27T12:04:05+00:00</LastReviewed>
+    <bucketTopic xmlns="bfc7ab43-a351-4688-aca3-bf166918b94c">Resources</bucketTopic>
+    <NextReviewDate xmlns="046f9449-3d25-46ac-9a39-b41fdb973d2f" xsi:nil="true"/>
+  </documentManagement>
+</p:properties>
 </file>
 
 <file path=customXml/itemProps1.xml><?xml version="1.0" encoding="utf-8"?>
-<ds:datastoreItem xmlns:ds="http://schemas.openxmlformats.org/officeDocument/2006/customXml" ds:itemID="{A379A1F7-3AE4-49C6-91E8-BBEDF6C6CA60}">
+<ds:datastoreItem xmlns:ds="http://schemas.openxmlformats.org/officeDocument/2006/customXml" ds:itemID="{F24517C6-1693-494B-8D53-44D782E1911F}">
   <ds:schemaRefs>
-    <ds:schemaRef ds:uri="http://purl.org/dc/elements/1.1/"/>
-    <ds:schemaRef ds:uri="http://schemas.microsoft.com/office/2006/metadata/properties"/>
-    <ds:schemaRef ds:uri="http://schemas.microsoft.com/office/infopath/2007/PartnerControls"/>
-    <ds:schemaRef ds:uri="http://schemas.microsoft.com/sharepoint/v3"/>
-    <ds:schemaRef ds:uri="http://purl.org/dc/terms/"/>
-    <ds:schemaRef ds:uri="http://schemas.microsoft.com/office/2006/documentManagement/types"/>
-    <ds:schemaRef ds:uri="http://purl.org/dc/dcmitype/"/>
-    <ds:schemaRef ds:uri="bfc7ab43-a351-4688-aca3-bf166918b94c"/>
-    <ds:schemaRef ds:uri="http://schemas.openxmlformats.org/package/2006/metadata/core-properties"/>
-    <ds:schemaRef ds:uri="a6fb58ca-3225-4afd-985f-6a849fc96194"/>
-    <ds:schemaRef ds:uri="046f9449-3d25-46ac-9a39-b41fdb973d2f"/>
-    <ds:schemaRef ds:uri="http://www.w3.org/XML/1998/namespace"/>
+    <ds:schemaRef ds:uri="http://schemas.microsoft.com/sharepoint/v3/contenttype/forms"/>
   </ds:schemaRefs>
 </ds:datastoreItem>
 </file>
 
 <file path=customXml/itemProps2.xml><?xml version="1.0" encoding="utf-8"?>
-<ds:datastoreItem xmlns:ds="http://schemas.openxmlformats.org/officeDocument/2006/customXml" ds:itemID="{5A137B2C-4AA5-4E63-A9A4-68C9C5A3D6F7}">
-  <ds:schemaRefs>
-    <ds:schemaRef ds:uri="http://schemas.microsoft.com/sharepoint/events"/>
-  </ds:schemaRefs>
-</ds:datastoreItem>
-</file>
-
-<file path=customXml/itemProps3.xml><?xml version="1.0" encoding="utf-8"?>
 <ds:datastoreItem xmlns:ds="http://schemas.openxmlformats.org/officeDocument/2006/customXml" ds:itemID="{CD304B63-F4B6-4202-BE3B-DAD345E9C560}">
   <ds:schemaRefs>
     <ds:schemaRef ds:uri="http://schemas.microsoft.com/office/2006/metadata/contentType"/>
@@ -12849,10 +12830,29 @@
 </ds:datastoreItem>
 </file>
 
+<file path=customXml/itemProps3.xml><?xml version="1.0" encoding="utf-8"?>
+<ds:datastoreItem xmlns:ds="http://schemas.openxmlformats.org/officeDocument/2006/customXml" ds:itemID="{5A137B2C-4AA5-4E63-A9A4-68C9C5A3D6F7}">
+  <ds:schemaRefs>
+    <ds:schemaRef ds:uri="http://schemas.microsoft.com/sharepoint/events"/>
+  </ds:schemaRefs>
+</ds:datastoreItem>
+</file>
+
 <file path=customXml/itemProps4.xml><?xml version="1.0" encoding="utf-8"?>
-<ds:datastoreItem xmlns:ds="http://schemas.openxmlformats.org/officeDocument/2006/customXml" ds:itemID="{F24517C6-1693-494B-8D53-44D782E1911F}">
+<ds:datastoreItem xmlns:ds="http://schemas.openxmlformats.org/officeDocument/2006/customXml" ds:itemID="{A379A1F7-3AE4-49C6-91E8-BBEDF6C6CA60}">
   <ds:schemaRefs>
-    <ds:schemaRef ds:uri="http://schemas.microsoft.com/sharepoint/v3/contenttype/forms"/>
+    <ds:schemaRef ds:uri="http://purl.org/dc/elements/1.1/"/>
+    <ds:schemaRef ds:uri="http://schemas.microsoft.com/office/2006/metadata/properties"/>
+    <ds:schemaRef ds:uri="http://schemas.microsoft.com/office/infopath/2007/PartnerControls"/>
+    <ds:schemaRef ds:uri="http://schemas.microsoft.com/sharepoint/v3"/>
+    <ds:schemaRef ds:uri="http://purl.org/dc/terms/"/>
+    <ds:schemaRef ds:uri="http://schemas.microsoft.com/office/2006/documentManagement/types"/>
+    <ds:schemaRef ds:uri="http://purl.org/dc/dcmitype/"/>
+    <ds:schemaRef ds:uri="bfc7ab43-a351-4688-aca3-bf166918b94c"/>
+    <ds:schemaRef ds:uri="http://schemas.openxmlformats.org/package/2006/metadata/core-properties"/>
+    <ds:schemaRef ds:uri="a6fb58ca-3225-4afd-985f-6a849fc96194"/>
+    <ds:schemaRef ds:uri="046f9449-3d25-46ac-9a39-b41fdb973d2f"/>
+    <ds:schemaRef ds:uri="http://www.w3.org/XML/1998/namespace"/>
   </ds:schemaRefs>
 </ds:datastoreItem>
 </file>
</xml_diff>